<commit_message>
Poster modified, added future work and failed case scenario
</commit_message>
<xml_diff>
--- a/doc/poster/poster.pptx
+++ b/doc/poster/poster.pptx
@@ -203,7 +203,7 @@
           <a:p>
             <a:fld id="{F1C0B079-A316-4C9B-B165-DF9EA8325D2C}" type="datetimeFigureOut">
               <a:rPr lang="en-US" smtClean="0"/>
-              <a:t>12/10/15</a:t>
+              <a:t>12/11/2015</a:t>
             </a:fld>
             <a:endParaRPr lang="en-US"/>
           </a:p>
@@ -368,7 +368,7 @@
           <a:p>
             <a:fld id="{38F28AB8-57D1-494F-9851-055AD867E790}" type="datetimeFigureOut">
               <a:rPr lang="en-US" smtClean="0"/>
-              <a:t>12/10/15</a:t>
+              <a:t>12/11/2015</a:t>
             </a:fld>
             <a:endParaRPr lang="en-US"/>
           </a:p>
@@ -636,6 +636,90 @@
 </p:notesMaster>
 </file>
 
+<file path=ppt/notesSlides/notesSlide1.xml><?xml version="1.0" encoding="utf-8"?>
+<p:notes xmlns:a="http://schemas.openxmlformats.org/drawingml/2006/main" xmlns:r="http://schemas.openxmlformats.org/officeDocument/2006/relationships" xmlns:p="http://schemas.openxmlformats.org/presentationml/2006/main">
+  <p:cSld>
+    <p:spTree>
+      <p:nvGrpSpPr>
+        <p:cNvPr id="1" name=""/>
+        <p:cNvGrpSpPr/>
+        <p:nvPr/>
+      </p:nvGrpSpPr>
+      <p:grpSpPr>
+        <a:xfrm>
+          <a:off x="0" y="0"/>
+          <a:ext cx="0" cy="0"/>
+          <a:chOff x="0" y="0"/>
+          <a:chExt cx="0" cy="0"/>
+        </a:xfrm>
+      </p:grpSpPr>
+      <p:sp>
+        <p:nvSpPr>
+          <p:cNvPr id="2" name="Slide Image Placeholder 1"/>
+          <p:cNvSpPr>
+            <a:spLocks noGrp="1" noRot="1" noChangeAspect="1"/>
+          </p:cNvSpPr>
+          <p:nvPr>
+            <p:ph type="sldImg"/>
+          </p:nvPr>
+        </p:nvSpPr>
+        <p:spPr/>
+      </p:sp>
+      <p:sp>
+        <p:nvSpPr>
+          <p:cNvPr id="3" name="Notes Placeholder 2"/>
+          <p:cNvSpPr>
+            <a:spLocks noGrp="1"/>
+          </p:cNvSpPr>
+          <p:nvPr>
+            <p:ph type="body" idx="1"/>
+          </p:nvPr>
+        </p:nvSpPr>
+        <p:spPr/>
+        <p:txBody>
+          <a:bodyPr/>
+          <a:lstStyle/>
+          <a:p>
+            <a:endParaRPr lang="en-US" dirty="0"/>
+          </a:p>
+        </p:txBody>
+      </p:sp>
+      <p:sp>
+        <p:nvSpPr>
+          <p:cNvPr id="4" name="Slide Number Placeholder 3"/>
+          <p:cNvSpPr>
+            <a:spLocks noGrp="1"/>
+          </p:cNvSpPr>
+          <p:nvPr>
+            <p:ph type="sldNum" sz="quarter" idx="10"/>
+          </p:nvPr>
+        </p:nvSpPr>
+        <p:spPr/>
+        <p:txBody>
+          <a:bodyPr/>
+          <a:lstStyle/>
+          <a:p>
+            <a:fld id="{37C7F044-5458-4B2E-BFA0-52AAA1C529D4}" type="slidenum">
+              <a:rPr lang="en-US" smtClean="0"/>
+              <a:t>1</a:t>
+            </a:fld>
+            <a:endParaRPr lang="en-US"/>
+          </a:p>
+        </p:txBody>
+      </p:sp>
+    </p:spTree>
+    <p:extLst>
+      <p:ext uri="{BB962C8B-B14F-4D97-AF65-F5344CB8AC3E}">
+        <p14:creationId xmlns:p14="http://schemas.microsoft.com/office/powerpoint/2010/main" val="4049971320"/>
+      </p:ext>
+    </p:extLst>
+  </p:cSld>
+  <p:clrMapOvr>
+    <a:masterClrMapping/>
+  </p:clrMapOvr>
+</p:notes>
+</file>
+
 <file path=ppt/slideLayouts/slideLayout1.xml><?xml version="1.0" encoding="utf-8"?>
 <p:sldLayout xmlns:a="http://schemas.openxmlformats.org/drawingml/2006/main" xmlns:r="http://schemas.openxmlformats.org/officeDocument/2006/relationships" xmlns:p="http://schemas.openxmlformats.org/presentationml/2006/main" preserve="1" userDrawn="1">
   <p:cSld name="Poster">
@@ -828,7 +912,7 @@
           <a:p>
             <a:fld id="{ECAA57DF-1C19-4726-AB84-014692BAD8F5}" type="datetimeFigureOut">
               <a:rPr lang="en-US" smtClean="0"/>
-              <a:t>12/10/15</a:t>
+              <a:t>12/11/2015</a:t>
             </a:fld>
             <a:endParaRPr lang="en-US"/>
           </a:p>
@@ -3558,7 +3642,7 @@
             <a:fld id="{ECAA57DF-1C19-4726-AB84-014692BAD8F5}" type="datetimeFigureOut">
               <a:rPr lang="en-US" smtClean="0"/>
               <a:pPr/>
-              <a:t>12/10/15</a:t>
+              <a:t>12/11/2015</a:t>
             </a:fld>
             <a:endParaRPr lang="en-US"/>
           </a:p>
@@ -4081,7 +4165,6 @@
               <a:rPr lang="en-US" dirty="0" smtClean="0"/>
               <a:t> [venkatesh369@unm.edu] with the University of New Mexico</a:t>
             </a:r>
-            <a:endParaRPr lang="en-US" dirty="0" smtClean="0"/>
           </a:p>
           <a:p>
             <a:endParaRPr lang="en-US" dirty="0"/>
@@ -4230,7 +4313,6 @@
               <a:rPr lang="en-US" b="1" dirty="0" smtClean="0"/>
               <a:t>AOLME </a:t>
             </a:r>
-            <a:endParaRPr lang="en-US" b="1" dirty="0" smtClean="0"/>
           </a:p>
           <a:p>
             <a:pPr lvl="1"/>
@@ -4238,19 +4320,13 @@
               <a:rPr lang="en-US" dirty="0" smtClean="0"/>
               <a:t>Project to help establish better metrics for teaching under represented groups in mathematics and engineering</a:t>
             </a:r>
-            <a:endParaRPr lang="en-US" dirty="0" smtClean="0"/>
           </a:p>
           <a:p>
             <a:pPr lvl="1"/>
             <a:r>
               <a:rPr lang="en-US" dirty="0" smtClean="0"/>
-              <a:t>Very large video database of interactions between students and facilitators</a:t>
-            </a:r>
-            <a:r>
-              <a:rPr lang="en-US" dirty="0" smtClean="0"/>
-              <a:t> </a:t>
-            </a:r>
-            <a:endParaRPr lang="en-US" dirty="0" smtClean="0"/>
+              <a:t>Very large video database of interactions between students and facilitators </a:t>
+            </a:r>
           </a:p>
           <a:p>
             <a:pPr lvl="1"/>
@@ -4265,7 +4341,6 @@
               <a:rPr lang="en-US" dirty="0" smtClean="0"/>
               <a:t>Faces in videos need to be obscured so that videos can be shared across domains without the need of an IRB</a:t>
             </a:r>
-            <a:endParaRPr lang="en-US" dirty="0" smtClean="0"/>
           </a:p>
           <a:p>
             <a:pPr marL="0" indent="0">
@@ -4435,7 +4510,6 @@
               <a:rPr lang="en-US" dirty="0" smtClean="0"/>
               <a:t> rate</a:t>
             </a:r>
-            <a:endParaRPr lang="en-US" dirty="0" smtClean="0"/>
           </a:p>
           <a:p>
             <a:r>
@@ -4501,7 +4575,6 @@
               <a:rPr lang="en-US" dirty="0" smtClean="0"/>
               <a:t>Video was too difficult to implement on existing big-data tools, so we start with Thunder</a:t>
             </a:r>
-            <a:endParaRPr lang="en-US" dirty="0" smtClean="0"/>
           </a:p>
           <a:p>
             <a:r>
@@ -4513,13 +4586,8 @@
             <a:pPr lvl="1"/>
             <a:r>
               <a:rPr lang="en-US" dirty="0" smtClean="0"/>
-              <a:t>Database consisted of faces that were manually annotated to benchmark results</a:t>
-            </a:r>
-            <a:r>
-              <a:rPr lang="en-US" dirty="0" smtClean="0"/>
-              <a:t> </a:t>
-            </a:r>
-            <a:endParaRPr lang="en-US" dirty="0" smtClean="0"/>
+              <a:t>Database consisted of faces that were manually annotated to benchmark results </a:t>
+            </a:r>
           </a:p>
           <a:p>
             <a:r>
@@ -4542,7 +4610,6 @@
               <a:rPr lang="en-US" dirty="0" smtClean="0"/>
               <a:t> Cascade with predefined training files (we did not need to train the classifier ourselves)</a:t>
             </a:r>
-            <a:endParaRPr lang="en-US" dirty="0" smtClean="0"/>
           </a:p>
           <a:p>
             <a:r>
@@ -4562,7 +4629,7 @@
           <p:nvPr/>
         </p:nvPicPr>
         <p:blipFill>
-          <a:blip r:embed="rId2">
+          <a:blip r:embed="rId3">
             <a:extLst>
               <a:ext uri="{28A0092B-C50C-407E-A947-70E740481C1C}">
                 <a14:useLocalDpi xmlns:a14="http://schemas.microsoft.com/office/drawing/2010/main" val="0"/>
@@ -4592,7 +4659,7 @@
           <p:nvPr/>
         </p:nvPicPr>
         <p:blipFill>
-          <a:blip r:embed="rId3">
+          <a:blip r:embed="rId4">
             <a:extLst>
               <a:ext uri="{28A0092B-C50C-407E-A947-70E740481C1C}">
                 <a14:useLocalDpi xmlns:a14="http://schemas.microsoft.com/office/drawing/2010/main" val="0"/>
@@ -4622,7 +4689,7 @@
           <p:nvPr/>
         </p:nvPicPr>
         <p:blipFill>
-          <a:blip r:embed="rId4">
+          <a:blip r:embed="rId5">
             <a:extLst>
               <a:ext uri="{28A0092B-C50C-407E-A947-70E740481C1C}">
                 <a14:useLocalDpi xmlns:a14="http://schemas.microsoft.com/office/drawing/2010/main" val="0"/>
@@ -4668,29 +4735,6 @@
       </p:sp>
       <p:sp>
         <p:nvSpPr>
-          <p:cNvPr id="16" name="Text Placeholder 15"/>
-          <p:cNvSpPr>
-            <a:spLocks noGrp="1"/>
-          </p:cNvSpPr>
-          <p:nvPr>
-            <p:ph type="body" sz="quarter" idx="29"/>
-          </p:nvPr>
-        </p:nvSpPr>
-        <p:spPr/>
-        <p:txBody>
-          <a:bodyPr/>
-          <a:lstStyle/>
-          <a:p>
-            <a:r>
-              <a:rPr lang="en-US" smtClean="0"/>
-              <a:t>results</a:t>
-            </a:r>
-            <a:endParaRPr lang="en-US" dirty="0"/>
-          </a:p>
-        </p:txBody>
-      </p:sp>
-      <p:sp>
-        <p:nvSpPr>
           <p:cNvPr id="17" name="Content Placeholder 16"/>
           <p:cNvSpPr>
             <a:spLocks noGrp="1"/>
@@ -4699,7 +4743,12 @@
             <p:ph sz="quarter" idx="30"/>
           </p:nvPr>
         </p:nvSpPr>
-        <p:spPr/>
+        <p:spPr>
+          <a:xfrm>
+            <a:off x="29900562" y="7614712"/>
+            <a:ext cx="12801600" cy="2272238"/>
+          </a:xfrm>
+        </p:spPr>
         <p:txBody>
           <a:bodyPr/>
           <a:lstStyle/>
@@ -4721,6 +4770,16 @@
             <a:r>
               <a:rPr lang="en-US" dirty="0" smtClean="0"/>
               <a:t> algorithms to images using Thunder</a:t>
+            </a:r>
+          </a:p>
+          <a:p>
+            <a:r>
+              <a:rPr lang="en-US" dirty="0" err="1" smtClean="0"/>
+              <a:t>Haar</a:t>
+            </a:r>
+            <a:r>
+              <a:rPr lang="en-US" dirty="0" smtClean="0"/>
+              <a:t> Cascade was trained using frontal face, and hence didn’t do well in cases of side faces</a:t>
             </a:r>
           </a:p>
           <a:p>
@@ -4761,13 +4820,18 @@
             <p:ph type="body" sz="quarter" idx="34"/>
           </p:nvPr>
         </p:nvSpPr>
-        <p:spPr/>
+        <p:spPr>
+          <a:xfrm>
+            <a:off x="30176292" y="17824323"/>
+            <a:ext cx="12801600" cy="1219200"/>
+          </a:xfrm>
+        </p:spPr>
         <p:txBody>
           <a:bodyPr/>
           <a:lstStyle/>
           <a:p>
             <a:r>
-              <a:rPr lang="en-US" smtClean="0"/>
+              <a:rPr lang="en-US" dirty="0" smtClean="0"/>
               <a:t>conclusions</a:t>
             </a:r>
             <a:endParaRPr lang="en-US" dirty="0"/>
@@ -4784,7 +4848,12 @@
             <p:ph sz="quarter" idx="35"/>
           </p:nvPr>
         </p:nvSpPr>
-        <p:spPr/>
+        <p:spPr>
+          <a:xfrm>
+            <a:off x="30176292" y="19741896"/>
+            <a:ext cx="12801600" cy="4572000"/>
+          </a:xfrm>
+        </p:spPr>
         <p:txBody>
           <a:bodyPr/>
           <a:lstStyle/>
@@ -4803,13 +4872,13 @@
             </a:r>
             <a:r>
               <a:rPr lang="en-US" dirty="0">
-                <a:hlinkClick r:id="rId5"/>
+                <a:hlinkClick r:id="rId6"/>
               </a:rPr>
               <a:t>https://</a:t>
             </a:r>
             <a:r>
               <a:rPr lang="en-US" dirty="0" smtClean="0">
-                <a:hlinkClick r:id="rId5"/>
+                <a:hlinkClick r:id="rId6"/>
               </a:rPr>
               <a:t>github.com/AcidLeroy/FaceObscuration</a:t>
             </a:r>
@@ -4839,7 +4908,7 @@
           <p:nvPr/>
         </p:nvPicPr>
         <p:blipFill>
-          <a:blip r:embed="rId6">
+          <a:blip r:embed="rId7">
             <a:extLst>
               <a:ext uri="{28A0092B-C50C-407E-A947-70E740481C1C}">
                 <a14:useLocalDpi xmlns:a14="http://schemas.microsoft.com/office/drawing/2010/main" val="0"/>
@@ -4871,7 +4940,7 @@
           </p:nvPr>
         </p:nvPicPr>
         <p:blipFill>
-          <a:blip r:embed="rId7">
+          <a:blip r:embed="rId8">
             <a:extLst>
               <a:ext uri="{28A0092B-C50C-407E-A947-70E740481C1C}">
                 <a14:useLocalDpi xmlns:a14="http://schemas.microsoft.com/office/drawing/2010/main" val="0"/>
@@ -4900,7 +4969,7 @@
           </p:nvPr>
         </p:nvPicPr>
         <p:blipFill>
-          <a:blip r:embed="rId8">
+          <a:blip r:embed="rId9">
             <a:extLst>
               <a:ext uri="{28A0092B-C50C-407E-A947-70E740481C1C}">
                 <a14:useLocalDpi xmlns:a14="http://schemas.microsoft.com/office/drawing/2010/main" val="0"/>
@@ -4913,27 +4982,561 @@
         </p:blipFill>
         <p:spPr>
           <a:xfrm>
-            <a:off x="30077753" y="7850171"/>
+            <a:off x="30176292" y="10580035"/>
             <a:ext cx="12250139" cy="6079189"/>
           </a:xfrm>
         </p:spPr>
       </p:pic>
+      <p:pic>
+        <p:nvPicPr>
+          <p:cNvPr id="36" name="Content Placeholder 35"/>
+          <p:cNvPicPr>
+            <a:picLocks noGrp="1" noChangeAspect="1"/>
+          </p:cNvPicPr>
+          <p:nvPr>
+            <p:ph sz="quarter" idx="33"/>
+          </p:nvPr>
+        </p:nvPicPr>
+        <p:blipFill>
+          <a:blip r:embed="rId10">
+            <a:extLst>
+              <a:ext uri="{28A0092B-C50C-407E-A947-70E740481C1C}">
+                <a14:useLocalDpi xmlns:a14="http://schemas.microsoft.com/office/drawing/2010/main" val="0"/>
+              </a:ext>
+            </a:extLst>
+          </a:blip>
+          <a:stretch>
+            <a:fillRect/>
+          </a:stretch>
+        </p:blipFill>
+        <p:spPr>
+          <a:xfrm>
+            <a:off x="15544800" y="24488775"/>
+            <a:ext cx="2834641" cy="3905250"/>
+          </a:xfrm>
+        </p:spPr>
+      </p:pic>
+      <p:pic>
+        <p:nvPicPr>
+          <p:cNvPr id="37" name="Picture 36"/>
+          <p:cNvPicPr>
+            <a:picLocks noChangeAspect="1"/>
+          </p:cNvPicPr>
+          <p:nvPr/>
+        </p:nvPicPr>
+        <p:blipFill>
+          <a:blip r:embed="rId11">
+            <a:extLst>
+              <a:ext uri="{28A0092B-C50C-407E-A947-70E740481C1C}">
+                <a14:useLocalDpi xmlns:a14="http://schemas.microsoft.com/office/drawing/2010/main" val="0"/>
+              </a:ext>
+            </a:extLst>
+          </a:blip>
+          <a:stretch>
+            <a:fillRect/>
+          </a:stretch>
+        </p:blipFill>
+        <p:spPr>
+          <a:xfrm>
+            <a:off x="18495458" y="24488775"/>
+            <a:ext cx="3039287" cy="3905250"/>
+          </a:xfrm>
+          <a:prstGeom prst="rect">
+            <a:avLst/>
+          </a:prstGeom>
+        </p:spPr>
+      </p:pic>
       <p:sp>
         <p:nvSpPr>
-          <p:cNvPr id="20" name="Content Placeholder 19"/>
+          <p:cNvPr id="38" name="Content Placeholder 14"/>
+          <p:cNvSpPr txBox="1">
+            <a:spLocks/>
+          </p:cNvSpPr>
+          <p:nvPr/>
+        </p:nvSpPr>
+        <p:spPr>
+          <a:xfrm>
+            <a:off x="15521781" y="28898850"/>
+            <a:ext cx="12801600" cy="1752600"/>
+          </a:xfrm>
+          <a:prstGeom prst="rect">
+            <a:avLst/>
+          </a:prstGeom>
+        </p:spPr>
+        <p:txBody>
+          <a:bodyPr vert="horz" lIns="91440" tIns="182880" rIns="91440" bIns="45720" rtlCol="0">
+            <a:normAutofit/>
+          </a:bodyPr>
+          <a:lstStyle>
+            <a:lvl1pPr marL="457200" indent="-457200" algn="l" defTabSz="4389120" rtl="0" eaLnBrk="1" latinLnBrk="0" hangingPunct="1">
+              <a:lnSpc>
+                <a:spcPct val="100000"/>
+              </a:lnSpc>
+              <a:spcBef>
+                <a:spcPts val="1200"/>
+              </a:spcBef>
+              <a:buClr>
+                <a:schemeClr val="accent2"/>
+              </a:buClr>
+              <a:buFont typeface="Arial" panose="020B0604020202020204" pitchFamily="34" charset="0"/>
+              <a:buChar char="•"/>
+              <a:defRPr sz="2800" kern="1200" baseline="0">
+                <a:solidFill>
+                  <a:schemeClr val="tx1"/>
+                </a:solidFill>
+                <a:latin typeface="+mn-lt"/>
+                <a:ea typeface="+mn-ea"/>
+                <a:cs typeface="+mn-cs"/>
+              </a:defRPr>
+            </a:lvl1pPr>
+            <a:lvl2pPr marL="1097280" indent="-457200" algn="l" defTabSz="4389120" rtl="0" eaLnBrk="1" latinLnBrk="0" hangingPunct="1">
+              <a:lnSpc>
+                <a:spcPct val="100000"/>
+              </a:lnSpc>
+              <a:spcBef>
+                <a:spcPts val="1200"/>
+              </a:spcBef>
+              <a:buClr>
+                <a:schemeClr val="accent2"/>
+              </a:buClr>
+              <a:buFont typeface="Arial" panose="020B0604020202020204" pitchFamily="34" charset="0"/>
+              <a:buChar char="•"/>
+              <a:defRPr sz="2400" kern="1200">
+                <a:solidFill>
+                  <a:schemeClr val="tx1"/>
+                </a:solidFill>
+                <a:latin typeface="+mn-lt"/>
+                <a:ea typeface="+mn-ea"/>
+                <a:cs typeface="+mn-cs"/>
+              </a:defRPr>
+            </a:lvl2pPr>
+            <a:lvl3pPr marL="1097280" indent="-457200" algn="l" defTabSz="4389120" rtl="0" eaLnBrk="1" latinLnBrk="0" hangingPunct="1">
+              <a:lnSpc>
+                <a:spcPct val="100000"/>
+              </a:lnSpc>
+              <a:spcBef>
+                <a:spcPts val="1200"/>
+              </a:spcBef>
+              <a:buClr>
+                <a:schemeClr val="accent2"/>
+              </a:buClr>
+              <a:buFont typeface="Arial" panose="020B0604020202020204" pitchFamily="34" charset="0"/>
+              <a:buChar char="•"/>
+              <a:defRPr sz="2400" kern="1200">
+                <a:solidFill>
+                  <a:schemeClr val="tx1"/>
+                </a:solidFill>
+                <a:latin typeface="+mn-lt"/>
+                <a:ea typeface="+mn-ea"/>
+                <a:cs typeface="+mn-cs"/>
+              </a:defRPr>
+            </a:lvl3pPr>
+            <a:lvl4pPr marL="1097280" indent="-457200" algn="l" defTabSz="4389120" rtl="0" eaLnBrk="1" latinLnBrk="0" hangingPunct="1">
+              <a:lnSpc>
+                <a:spcPct val="100000"/>
+              </a:lnSpc>
+              <a:spcBef>
+                <a:spcPts val="1200"/>
+              </a:spcBef>
+              <a:buClr>
+                <a:schemeClr val="accent2"/>
+              </a:buClr>
+              <a:buFont typeface="Arial" panose="020B0604020202020204" pitchFamily="34" charset="0"/>
+              <a:buChar char="•"/>
+              <a:defRPr sz="2400" kern="1200">
+                <a:solidFill>
+                  <a:schemeClr val="tx1"/>
+                </a:solidFill>
+                <a:latin typeface="+mn-lt"/>
+                <a:ea typeface="+mn-ea"/>
+                <a:cs typeface="+mn-cs"/>
+              </a:defRPr>
+            </a:lvl4pPr>
+            <a:lvl5pPr marL="1097280" indent="-457200" algn="l" defTabSz="4389120" rtl="0" eaLnBrk="1" latinLnBrk="0" hangingPunct="1">
+              <a:lnSpc>
+                <a:spcPct val="100000"/>
+              </a:lnSpc>
+              <a:spcBef>
+                <a:spcPts val="1200"/>
+              </a:spcBef>
+              <a:buClr>
+                <a:schemeClr val="accent2"/>
+              </a:buClr>
+              <a:buFont typeface="Arial" panose="020B0604020202020204" pitchFamily="34" charset="0"/>
+              <a:buChar char="•"/>
+              <a:defRPr sz="2400" kern="1200">
+                <a:solidFill>
+                  <a:schemeClr val="tx1"/>
+                </a:solidFill>
+                <a:latin typeface="+mn-lt"/>
+                <a:ea typeface="+mn-ea"/>
+                <a:cs typeface="+mn-cs"/>
+              </a:defRPr>
+            </a:lvl5pPr>
+            <a:lvl6pPr marL="1097280" indent="-457200" algn="l" defTabSz="4389120" rtl="0" eaLnBrk="1" latinLnBrk="0" hangingPunct="1">
+              <a:lnSpc>
+                <a:spcPct val="100000"/>
+              </a:lnSpc>
+              <a:spcBef>
+                <a:spcPts val="1200"/>
+              </a:spcBef>
+              <a:buClr>
+                <a:schemeClr val="accent2"/>
+              </a:buClr>
+              <a:buFont typeface="Arial" panose="020B0604020202020204" pitchFamily="34" charset="0"/>
+              <a:buChar char="•"/>
+              <a:defRPr sz="2400" kern="1200">
+                <a:solidFill>
+                  <a:schemeClr val="tx1"/>
+                </a:solidFill>
+                <a:latin typeface="+mn-lt"/>
+                <a:ea typeface="+mn-ea"/>
+                <a:cs typeface="+mn-cs"/>
+              </a:defRPr>
+            </a:lvl6pPr>
+            <a:lvl7pPr marL="1097280" indent="-457200" algn="l" defTabSz="4389120" rtl="0" eaLnBrk="1" latinLnBrk="0" hangingPunct="1">
+              <a:lnSpc>
+                <a:spcPct val="100000"/>
+              </a:lnSpc>
+              <a:spcBef>
+                <a:spcPts val="1200"/>
+              </a:spcBef>
+              <a:buClr>
+                <a:schemeClr val="accent2"/>
+              </a:buClr>
+              <a:buFont typeface="Arial" panose="020B0604020202020204" pitchFamily="34" charset="0"/>
+              <a:buChar char="•"/>
+              <a:defRPr sz="2400" kern="1200">
+                <a:solidFill>
+                  <a:schemeClr val="tx1"/>
+                </a:solidFill>
+                <a:latin typeface="+mn-lt"/>
+                <a:ea typeface="+mn-ea"/>
+                <a:cs typeface="+mn-cs"/>
+              </a:defRPr>
+            </a:lvl7pPr>
+            <a:lvl8pPr marL="1097280" indent="-457200" algn="l" defTabSz="4389120" rtl="0" eaLnBrk="1" latinLnBrk="0" hangingPunct="1">
+              <a:lnSpc>
+                <a:spcPct val="100000"/>
+              </a:lnSpc>
+              <a:spcBef>
+                <a:spcPts val="1200"/>
+              </a:spcBef>
+              <a:buClr>
+                <a:schemeClr val="accent2"/>
+              </a:buClr>
+              <a:buFont typeface="Arial" panose="020B0604020202020204" pitchFamily="34" charset="0"/>
+              <a:buChar char="•"/>
+              <a:defRPr sz="2400" kern="1200">
+                <a:solidFill>
+                  <a:schemeClr val="tx1"/>
+                </a:solidFill>
+                <a:latin typeface="+mn-lt"/>
+                <a:ea typeface="+mn-ea"/>
+                <a:cs typeface="+mn-cs"/>
+              </a:defRPr>
+            </a:lvl8pPr>
+            <a:lvl9pPr marL="1097280" indent="-457200" algn="l" defTabSz="4389120" rtl="0" eaLnBrk="1" latinLnBrk="0" hangingPunct="1">
+              <a:lnSpc>
+                <a:spcPct val="100000"/>
+              </a:lnSpc>
+              <a:spcBef>
+                <a:spcPts val="1200"/>
+              </a:spcBef>
+              <a:buClr>
+                <a:schemeClr val="accent2"/>
+              </a:buClr>
+              <a:buFont typeface="Arial" panose="020B0604020202020204" pitchFamily="34" charset="0"/>
+              <a:buChar char="•"/>
+              <a:defRPr sz="2400" kern="1200">
+                <a:solidFill>
+                  <a:schemeClr val="tx1"/>
+                </a:solidFill>
+                <a:latin typeface="+mn-lt"/>
+                <a:ea typeface="+mn-ea"/>
+                <a:cs typeface="+mn-cs"/>
+              </a:defRPr>
+            </a:lvl9pPr>
+          </a:lstStyle>
+          <a:p>
+            <a:r>
+              <a:rPr lang="en-US" dirty="0" smtClean="0"/>
+              <a:t>Failed face obscurations.</a:t>
+            </a:r>
+            <a:endParaRPr lang="en-US" dirty="0"/>
+          </a:p>
+        </p:txBody>
+      </p:sp>
+      <p:sp>
+        <p:nvSpPr>
+          <p:cNvPr id="39" name="Text Placeholder 4"/>
           <p:cNvSpPr>
             <a:spLocks noGrp="1"/>
           </p:cNvSpPr>
           <p:nvPr>
-            <p:ph sz="quarter" idx="33"/>
+            <p:ph type="body" sz="quarter" idx="13"/>
           </p:nvPr>
         </p:nvSpPr>
-        <p:spPr/>
+        <p:spPr>
+          <a:xfrm>
+            <a:off x="30176292" y="23736300"/>
+            <a:ext cx="12801600" cy="1219200"/>
+          </a:xfrm>
+        </p:spPr>
         <p:txBody>
           <a:bodyPr/>
           <a:lstStyle/>
           <a:p>
-            <a:endParaRPr lang="en-US"/>
+            <a:r>
+              <a:rPr lang="en-US" dirty="0" smtClean="0"/>
+              <a:t>Future work</a:t>
+            </a:r>
+            <a:endParaRPr lang="en-US" dirty="0"/>
+          </a:p>
+        </p:txBody>
+      </p:sp>
+      <p:sp>
+        <p:nvSpPr>
+          <p:cNvPr id="40" name="Content Placeholder 21"/>
+          <p:cNvSpPr txBox="1">
+            <a:spLocks/>
+          </p:cNvSpPr>
+          <p:nvPr/>
+        </p:nvSpPr>
+        <p:spPr>
+          <a:xfrm>
+            <a:off x="29900561" y="25340101"/>
+            <a:ext cx="12801600" cy="4572000"/>
+          </a:xfrm>
+          <a:prstGeom prst="rect">
+            <a:avLst/>
+          </a:prstGeom>
+        </p:spPr>
+        <p:txBody>
+          <a:bodyPr vert="horz" lIns="365760" tIns="182880" rIns="91440" bIns="45720" rtlCol="0">
+            <a:normAutofit/>
+          </a:bodyPr>
+          <a:lstStyle>
+            <a:lvl1pPr marL="457200" indent="-457200" algn="l" defTabSz="4389120" rtl="0" eaLnBrk="1" latinLnBrk="0" hangingPunct="1">
+              <a:lnSpc>
+                <a:spcPct val="100000"/>
+              </a:lnSpc>
+              <a:spcBef>
+                <a:spcPts val="1200"/>
+              </a:spcBef>
+              <a:buClr>
+                <a:schemeClr val="accent2"/>
+              </a:buClr>
+              <a:buFont typeface="Arial" panose="020B0604020202020204" pitchFamily="34" charset="0"/>
+              <a:buChar char="•"/>
+              <a:defRPr sz="2800" kern="1200" baseline="0">
+                <a:solidFill>
+                  <a:schemeClr val="tx1"/>
+                </a:solidFill>
+                <a:latin typeface="+mn-lt"/>
+                <a:ea typeface="+mn-ea"/>
+                <a:cs typeface="+mn-cs"/>
+              </a:defRPr>
+            </a:lvl1pPr>
+            <a:lvl2pPr marL="1097280" indent="-457200" algn="l" defTabSz="4389120" rtl="0" eaLnBrk="1" latinLnBrk="0" hangingPunct="1">
+              <a:lnSpc>
+                <a:spcPct val="100000"/>
+              </a:lnSpc>
+              <a:spcBef>
+                <a:spcPts val="1200"/>
+              </a:spcBef>
+              <a:buClr>
+                <a:schemeClr val="accent2"/>
+              </a:buClr>
+              <a:buFont typeface="Arial" panose="020B0604020202020204" pitchFamily="34" charset="0"/>
+              <a:buChar char="•"/>
+              <a:defRPr sz="2400" kern="1200">
+                <a:solidFill>
+                  <a:schemeClr val="tx1"/>
+                </a:solidFill>
+                <a:latin typeface="+mn-lt"/>
+                <a:ea typeface="+mn-ea"/>
+                <a:cs typeface="+mn-cs"/>
+              </a:defRPr>
+            </a:lvl2pPr>
+            <a:lvl3pPr marL="1097280" indent="-457200" algn="l" defTabSz="4389120" rtl="0" eaLnBrk="1" latinLnBrk="0" hangingPunct="1">
+              <a:lnSpc>
+                <a:spcPct val="100000"/>
+              </a:lnSpc>
+              <a:spcBef>
+                <a:spcPts val="1200"/>
+              </a:spcBef>
+              <a:buClr>
+                <a:schemeClr val="accent2"/>
+              </a:buClr>
+              <a:buFont typeface="Arial" panose="020B0604020202020204" pitchFamily="34" charset="0"/>
+              <a:buChar char="•"/>
+              <a:defRPr sz="2400" kern="1200">
+                <a:solidFill>
+                  <a:schemeClr val="tx1"/>
+                </a:solidFill>
+                <a:latin typeface="+mn-lt"/>
+                <a:ea typeface="+mn-ea"/>
+                <a:cs typeface="+mn-cs"/>
+              </a:defRPr>
+            </a:lvl3pPr>
+            <a:lvl4pPr marL="1097280" indent="-457200" algn="l" defTabSz="4389120" rtl="0" eaLnBrk="1" latinLnBrk="0" hangingPunct="1">
+              <a:lnSpc>
+                <a:spcPct val="100000"/>
+              </a:lnSpc>
+              <a:spcBef>
+                <a:spcPts val="1200"/>
+              </a:spcBef>
+              <a:buClr>
+                <a:schemeClr val="accent2"/>
+              </a:buClr>
+              <a:buFont typeface="Arial" panose="020B0604020202020204" pitchFamily="34" charset="0"/>
+              <a:buChar char="•"/>
+              <a:defRPr sz="2400" kern="1200">
+                <a:solidFill>
+                  <a:schemeClr val="tx1"/>
+                </a:solidFill>
+                <a:latin typeface="+mn-lt"/>
+                <a:ea typeface="+mn-ea"/>
+                <a:cs typeface="+mn-cs"/>
+              </a:defRPr>
+            </a:lvl4pPr>
+            <a:lvl5pPr marL="1097280" indent="-457200" algn="l" defTabSz="4389120" rtl="0" eaLnBrk="1" latinLnBrk="0" hangingPunct="1">
+              <a:lnSpc>
+                <a:spcPct val="100000"/>
+              </a:lnSpc>
+              <a:spcBef>
+                <a:spcPts val="1200"/>
+              </a:spcBef>
+              <a:buClr>
+                <a:schemeClr val="accent2"/>
+              </a:buClr>
+              <a:buFont typeface="Arial" panose="020B0604020202020204" pitchFamily="34" charset="0"/>
+              <a:buChar char="•"/>
+              <a:defRPr sz="2400" kern="1200">
+                <a:solidFill>
+                  <a:schemeClr val="tx1"/>
+                </a:solidFill>
+                <a:latin typeface="+mn-lt"/>
+                <a:ea typeface="+mn-ea"/>
+                <a:cs typeface="+mn-cs"/>
+              </a:defRPr>
+            </a:lvl5pPr>
+            <a:lvl6pPr marL="1097280" indent="-457200" algn="l" defTabSz="4389120" rtl="0" eaLnBrk="1" latinLnBrk="0" hangingPunct="1">
+              <a:lnSpc>
+                <a:spcPct val="100000"/>
+              </a:lnSpc>
+              <a:spcBef>
+                <a:spcPts val="1200"/>
+              </a:spcBef>
+              <a:buClr>
+                <a:schemeClr val="accent2"/>
+              </a:buClr>
+              <a:buFont typeface="Arial" panose="020B0604020202020204" pitchFamily="34" charset="0"/>
+              <a:buChar char="•"/>
+              <a:defRPr sz="2400" kern="1200">
+                <a:solidFill>
+                  <a:schemeClr val="tx1"/>
+                </a:solidFill>
+                <a:latin typeface="+mn-lt"/>
+                <a:ea typeface="+mn-ea"/>
+                <a:cs typeface="+mn-cs"/>
+              </a:defRPr>
+            </a:lvl6pPr>
+            <a:lvl7pPr marL="1097280" indent="-457200" algn="l" defTabSz="4389120" rtl="0" eaLnBrk="1" latinLnBrk="0" hangingPunct="1">
+              <a:lnSpc>
+                <a:spcPct val="100000"/>
+              </a:lnSpc>
+              <a:spcBef>
+                <a:spcPts val="1200"/>
+              </a:spcBef>
+              <a:buClr>
+                <a:schemeClr val="accent2"/>
+              </a:buClr>
+              <a:buFont typeface="Arial" panose="020B0604020202020204" pitchFamily="34" charset="0"/>
+              <a:buChar char="•"/>
+              <a:defRPr sz="2400" kern="1200">
+                <a:solidFill>
+                  <a:schemeClr val="tx1"/>
+                </a:solidFill>
+                <a:latin typeface="+mn-lt"/>
+                <a:ea typeface="+mn-ea"/>
+                <a:cs typeface="+mn-cs"/>
+              </a:defRPr>
+            </a:lvl7pPr>
+            <a:lvl8pPr marL="1097280" indent="-457200" algn="l" defTabSz="4389120" rtl="0" eaLnBrk="1" latinLnBrk="0" hangingPunct="1">
+              <a:lnSpc>
+                <a:spcPct val="100000"/>
+              </a:lnSpc>
+              <a:spcBef>
+                <a:spcPts val="1200"/>
+              </a:spcBef>
+              <a:buClr>
+                <a:schemeClr val="accent2"/>
+              </a:buClr>
+              <a:buFont typeface="Arial" panose="020B0604020202020204" pitchFamily="34" charset="0"/>
+              <a:buChar char="•"/>
+              <a:defRPr sz="2400" kern="1200">
+                <a:solidFill>
+                  <a:schemeClr val="tx1"/>
+                </a:solidFill>
+                <a:latin typeface="+mn-lt"/>
+                <a:ea typeface="+mn-ea"/>
+                <a:cs typeface="+mn-cs"/>
+              </a:defRPr>
+            </a:lvl8pPr>
+            <a:lvl9pPr marL="1097280" indent="-457200" algn="l" defTabSz="4389120" rtl="0" eaLnBrk="1" latinLnBrk="0" hangingPunct="1">
+              <a:lnSpc>
+                <a:spcPct val="100000"/>
+              </a:lnSpc>
+              <a:spcBef>
+                <a:spcPts val="1200"/>
+              </a:spcBef>
+              <a:buClr>
+                <a:schemeClr val="accent2"/>
+              </a:buClr>
+              <a:buFont typeface="Arial" panose="020B0604020202020204" pitchFamily="34" charset="0"/>
+              <a:buChar char="•"/>
+              <a:defRPr sz="2400" kern="1200">
+                <a:solidFill>
+                  <a:schemeClr val="tx1"/>
+                </a:solidFill>
+                <a:latin typeface="+mn-lt"/>
+                <a:ea typeface="+mn-ea"/>
+                <a:cs typeface="+mn-cs"/>
+              </a:defRPr>
+            </a:lvl9pPr>
+          </a:lstStyle>
+          <a:p>
+            <a:r>
+              <a:rPr lang="en-US" dirty="0" smtClean="0"/>
+              <a:t>Improving face detection by training </a:t>
+            </a:r>
+            <a:r>
+              <a:rPr lang="en-US" dirty="0" err="1" smtClean="0"/>
+              <a:t>Haar</a:t>
+            </a:r>
+            <a:r>
+              <a:rPr lang="en-US" dirty="0" smtClean="0"/>
+              <a:t> Cascades on side face.</a:t>
+            </a:r>
+          </a:p>
+          <a:p>
+            <a:r>
+              <a:rPr lang="en-US" dirty="0" smtClean="0"/>
+              <a:t>Exploring new tools that readily accept video data.</a:t>
+            </a:r>
+          </a:p>
+          <a:p>
+            <a:r>
+              <a:rPr lang="en-US" dirty="0" smtClean="0"/>
+              <a:t>Objective analysis of the method is needed to analyze performance </a:t>
+            </a:r>
+            <a:r>
+              <a:rPr lang="en-US" smtClean="0"/>
+              <a:t>quickly.</a:t>
+            </a:r>
+            <a:endParaRPr lang="en-US" dirty="0" smtClean="0"/>
           </a:p>
         </p:txBody>
       </p:sp>
@@ -5812,142 +6415,6 @@
 </file>
 
 <file path=customXml/item1.xml><?xml version="1.0" encoding="utf-8"?>
-<p:properties xmlns:p="http://schemas.microsoft.com/office/2006/metadata/properties" xmlns:xsi="http://www.w3.org/2001/XMLSchema-instance" xmlns:pc="http://schemas.microsoft.com/office/infopath/2007/PartnerControls">
-  <documentManagement>
-    <DirectSourceMarket xmlns="4873beb7-5857-4685-be1f-d57550cc96cc" xsi:nil="true"/>
-    <ApprovalStatus xmlns="4873beb7-5857-4685-be1f-d57550cc96cc">InProgress</ApprovalStatus>
-    <MarketSpecific xmlns="4873beb7-5857-4685-be1f-d57550cc96cc">false</MarketSpecific>
-    <LocComments xmlns="4873beb7-5857-4685-be1f-d57550cc96cc" xsi:nil="true"/>
-    <ThumbnailAssetId xmlns="4873beb7-5857-4685-be1f-d57550cc96cc" xsi:nil="true"/>
-    <PrimaryImageGen xmlns="4873beb7-5857-4685-be1f-d57550cc96cc">true</PrimaryImageGen>
-    <LegacyData xmlns="4873beb7-5857-4685-be1f-d57550cc96cc" xsi:nil="true"/>
-    <LocRecommendedHandoff xmlns="4873beb7-5857-4685-be1f-d57550cc96cc" xsi:nil="true"/>
-    <BusinessGroup xmlns="4873beb7-5857-4685-be1f-d57550cc96cc" xsi:nil="true"/>
-    <BlockPublish xmlns="4873beb7-5857-4685-be1f-d57550cc96cc">false</BlockPublish>
-    <TPFriendlyName xmlns="4873beb7-5857-4685-be1f-d57550cc96cc" xsi:nil="true"/>
-    <NumericId xmlns="4873beb7-5857-4685-be1f-d57550cc96cc" xsi:nil="true"/>
-    <APEditor xmlns="4873beb7-5857-4685-be1f-d57550cc96cc">
-      <UserInfo>
-        <DisplayName/>
-        <AccountId xsi:nil="true"/>
-        <AccountType/>
-      </UserInfo>
-    </APEditor>
-    <SourceTitle xmlns="4873beb7-5857-4685-be1f-d57550cc96cc" xsi:nil="true"/>
-    <OpenTemplate xmlns="4873beb7-5857-4685-be1f-d57550cc96cc">true</OpenTemplate>
-    <UALocComments xmlns="4873beb7-5857-4685-be1f-d57550cc96cc" xsi:nil="true"/>
-    <ParentAssetId xmlns="4873beb7-5857-4685-be1f-d57550cc96cc" xsi:nil="true"/>
-    <IntlLangReviewDate xmlns="4873beb7-5857-4685-be1f-d57550cc96cc" xsi:nil="true"/>
-    <FeatureTagsTaxHTField0 xmlns="4873beb7-5857-4685-be1f-d57550cc96cc">
-      <Terms xmlns="http://schemas.microsoft.com/office/infopath/2007/PartnerControls"/>
-    </FeatureTagsTaxHTField0>
-    <PublishStatusLookup xmlns="4873beb7-5857-4685-be1f-d57550cc96cc">
-      <Value>1669414</Value>
-      <Value>1669470</Value>
-    </PublishStatusLookup>
-    <Providers xmlns="4873beb7-5857-4685-be1f-d57550cc96cc" xsi:nil="true"/>
-    <MachineTranslated xmlns="4873beb7-5857-4685-be1f-d57550cc96cc">false</MachineTranslated>
-    <OriginalSourceMarket xmlns="4873beb7-5857-4685-be1f-d57550cc96cc" xsi:nil="true"/>
-    <APDescription xmlns="4873beb7-5857-4685-be1f-d57550cc96cc" xsi:nil="true"/>
-    <ClipArtFilename xmlns="4873beb7-5857-4685-be1f-d57550cc96cc" xsi:nil="true"/>
-    <ContentItem xmlns="4873beb7-5857-4685-be1f-d57550cc96cc" xsi:nil="true"/>
-    <TPInstallLocation xmlns="4873beb7-5857-4685-be1f-d57550cc96cc" xsi:nil="true"/>
-    <PublishTargets xmlns="4873beb7-5857-4685-be1f-d57550cc96cc">OfficeOnlineVNext</PublishTargets>
-    <TimesCloned xmlns="4873beb7-5857-4685-be1f-d57550cc96cc" xsi:nil="true"/>
-    <AssetStart xmlns="4873beb7-5857-4685-be1f-d57550cc96cc">2013-01-21T12:05:00+00:00</AssetStart>
-    <Provider xmlns="4873beb7-5857-4685-be1f-d57550cc96cc" xsi:nil="true"/>
-    <AcquiredFrom xmlns="4873beb7-5857-4685-be1f-d57550cc96cc">Internal MS</AcquiredFrom>
-    <FriendlyTitle xmlns="4873beb7-5857-4685-be1f-d57550cc96cc" xsi:nil="true"/>
-    <LastHandOff xmlns="4873beb7-5857-4685-be1f-d57550cc96cc" xsi:nil="true"/>
-    <TPClientViewer xmlns="4873beb7-5857-4685-be1f-d57550cc96cc" xsi:nil="true"/>
-    <UACurrentWords xmlns="4873beb7-5857-4685-be1f-d57550cc96cc" xsi:nil="true"/>
-    <ArtSampleDocs xmlns="4873beb7-5857-4685-be1f-d57550cc96cc" xsi:nil="true"/>
-    <UALocRecommendation xmlns="4873beb7-5857-4685-be1f-d57550cc96cc">Localize</UALocRecommendation>
-    <Manager xmlns="4873beb7-5857-4685-be1f-d57550cc96cc" xsi:nil="true"/>
-    <ShowIn xmlns="4873beb7-5857-4685-be1f-d57550cc96cc">Show everywhere</ShowIn>
-    <UANotes xmlns="4873beb7-5857-4685-be1f-d57550cc96cc" xsi:nil="true"/>
-    <TemplateStatus xmlns="4873beb7-5857-4685-be1f-d57550cc96cc">Complete</TemplateStatus>
-    <InternalTagsTaxHTField0 xmlns="4873beb7-5857-4685-be1f-d57550cc96cc">
-      <Terms xmlns="http://schemas.microsoft.com/office/infopath/2007/PartnerControls"/>
-    </InternalTagsTaxHTField0>
-    <CSXHash xmlns="4873beb7-5857-4685-be1f-d57550cc96cc" xsi:nil="true"/>
-    <Downloads xmlns="4873beb7-5857-4685-be1f-d57550cc96cc">0</Downloads>
-    <VoteCount xmlns="4873beb7-5857-4685-be1f-d57550cc96cc" xsi:nil="true"/>
-    <OOCacheId xmlns="4873beb7-5857-4685-be1f-d57550cc96cc" xsi:nil="true"/>
-    <IsDeleted xmlns="4873beb7-5857-4685-be1f-d57550cc96cc">false</IsDeleted>
-    <AssetExpire xmlns="4873beb7-5857-4685-be1f-d57550cc96cc">2029-01-01T08:00:00+00:00</AssetExpire>
-    <DSATActionTaken xmlns="4873beb7-5857-4685-be1f-d57550cc96cc" xsi:nil="true"/>
-    <CSXSubmissionMarket xmlns="4873beb7-5857-4685-be1f-d57550cc96cc" xsi:nil="true"/>
-    <TPExecutable xmlns="4873beb7-5857-4685-be1f-d57550cc96cc" xsi:nil="true"/>
-    <SubmitterId xmlns="4873beb7-5857-4685-be1f-d57550cc96cc" xsi:nil="true"/>
-    <EditorialTags xmlns="4873beb7-5857-4685-be1f-d57550cc96cc" xsi:nil="true"/>
-    <AssetType xmlns="4873beb7-5857-4685-be1f-d57550cc96cc">TP</AssetType>
-    <BugNumber xmlns="4873beb7-5857-4685-be1f-d57550cc96cc" xsi:nil="true"/>
-    <CSXSubmissionDate xmlns="4873beb7-5857-4685-be1f-d57550cc96cc" xsi:nil="true"/>
-    <CSXUpdate xmlns="4873beb7-5857-4685-be1f-d57550cc96cc">false</CSXUpdate>
-    <ApprovalLog xmlns="4873beb7-5857-4685-be1f-d57550cc96cc" xsi:nil="true"/>
-    <Milestone xmlns="4873beb7-5857-4685-be1f-d57550cc96cc" xsi:nil="true"/>
-    <RecommendationsModifier xmlns="4873beb7-5857-4685-be1f-d57550cc96cc" xsi:nil="true"/>
-    <OriginAsset xmlns="4873beb7-5857-4685-be1f-d57550cc96cc" xsi:nil="true"/>
-    <TPComponent xmlns="4873beb7-5857-4685-be1f-d57550cc96cc" xsi:nil="true"/>
-    <AssetId xmlns="4873beb7-5857-4685-be1f-d57550cc96cc">TP104001550</AssetId>
-    <IntlLocPriority xmlns="4873beb7-5857-4685-be1f-d57550cc96cc" xsi:nil="true"/>
-    <PolicheckWords xmlns="4873beb7-5857-4685-be1f-d57550cc96cc" xsi:nil="true"/>
-    <TPLaunchHelpLink xmlns="4873beb7-5857-4685-be1f-d57550cc96cc" xsi:nil="true"/>
-    <TPApplication xmlns="4873beb7-5857-4685-be1f-d57550cc96cc" xsi:nil="true"/>
-    <CrawlForDependencies xmlns="4873beb7-5857-4685-be1f-d57550cc96cc">false</CrawlForDependencies>
-    <HandoffToMSDN xmlns="4873beb7-5857-4685-be1f-d57550cc96cc" xsi:nil="true"/>
-    <PlannedPubDate xmlns="4873beb7-5857-4685-be1f-d57550cc96cc" xsi:nil="true"/>
-    <IntlLangReviewer xmlns="4873beb7-5857-4685-be1f-d57550cc96cc" xsi:nil="true"/>
-    <TrustLevel xmlns="4873beb7-5857-4685-be1f-d57550cc96cc">1 Microsoft Managed Content</TrustLevel>
-    <LocLastLocAttemptVersionLookup xmlns="4873beb7-5857-4685-be1f-d57550cc96cc">875987</LocLastLocAttemptVersionLookup>
-    <IsSearchable xmlns="4873beb7-5857-4685-be1f-d57550cc96cc">true</IsSearchable>
-    <TemplateTemplateType xmlns="4873beb7-5857-4685-be1f-d57550cc96cc">PowerPoint Presentation Template</TemplateTemplateType>
-    <CampaignTagsTaxHTField0 xmlns="4873beb7-5857-4685-be1f-d57550cc96cc">
-      <Terms xmlns="http://schemas.microsoft.com/office/infopath/2007/PartnerControls"/>
-    </CampaignTagsTaxHTField0>
-    <TPNamespace xmlns="4873beb7-5857-4685-be1f-d57550cc96cc" xsi:nil="true"/>
-    <TaxCatchAll xmlns="4873beb7-5857-4685-be1f-d57550cc96cc"/>
-    <Markets xmlns="4873beb7-5857-4685-be1f-d57550cc96cc"/>
-    <UAProjectedTotalWords xmlns="4873beb7-5857-4685-be1f-d57550cc96cc" xsi:nil="true"/>
-    <LocMarketGroupTiers2 xmlns="4873beb7-5857-4685-be1f-d57550cc96cc" xsi:nil="true"/>
-    <IntlLangReview xmlns="4873beb7-5857-4685-be1f-d57550cc96cc">false</IntlLangReview>
-    <OutputCachingOn xmlns="4873beb7-5857-4685-be1f-d57550cc96cc">false</OutputCachingOn>
-    <AverageRating xmlns="4873beb7-5857-4685-be1f-d57550cc96cc" xsi:nil="true"/>
-    <APAuthor xmlns="4873beb7-5857-4685-be1f-d57550cc96cc">
-      <UserInfo>
-        <DisplayName>REDMOND\kristaa</DisplayName>
-        <AccountId>136</AccountId>
-        <AccountType/>
-      </UserInfo>
-    </APAuthor>
-    <LocManualTestRequired xmlns="4873beb7-5857-4685-be1f-d57550cc96cc">false</LocManualTestRequired>
-    <TPCommandLine xmlns="4873beb7-5857-4685-be1f-d57550cc96cc" xsi:nil="true"/>
-    <TPAppVersion xmlns="4873beb7-5857-4685-be1f-d57550cc96cc" xsi:nil="true"/>
-    <EditorialStatus xmlns="4873beb7-5857-4685-be1f-d57550cc96cc">Complete</EditorialStatus>
-    <LastModifiedDateTime xmlns="4873beb7-5857-4685-be1f-d57550cc96cc" xsi:nil="true"/>
-    <ScenarioTagsTaxHTField0 xmlns="4873beb7-5857-4685-be1f-d57550cc96cc">
-      <Terms xmlns="http://schemas.microsoft.com/office/infopath/2007/PartnerControls"/>
-    </ScenarioTagsTaxHTField0>
-    <OriginalRelease xmlns="4873beb7-5857-4685-be1f-d57550cc96cc">15</OriginalRelease>
-    <TPLaunchHelpLinkType xmlns="4873beb7-5857-4685-be1f-d57550cc96cc">Template</TPLaunchHelpLinkType>
-    <LocalizationTagsTaxHTField0 xmlns="4873beb7-5857-4685-be1f-d57550cc96cc">
-      <Terms xmlns="http://schemas.microsoft.com/office/infopath/2007/PartnerControls"/>
-    </LocalizationTagsTaxHTField0>
-  </documentManagement>
-</p:properties>
-</file>
-
-<file path=customXml/item2.xml><?xml version="1.0" encoding="utf-8"?>
-<?mso-contentType ?>
-<FormTemplates xmlns="http://schemas.microsoft.com/sharepoint/v3/contenttype/forms">
-  <Display>DocumentLibraryForm</Display>
-  <Edit>AssetEditForm</Edit>
-  <New>DocumentLibraryForm</New>
-</FormTemplates>
-</file>
-
-<file path=customXml/item3.xml><?xml version="1.0" encoding="utf-8"?>
 <ct:contentTypeSchema xmlns:ct="http://schemas.microsoft.com/office/2006/metadata/contentType" xmlns:ma="http://schemas.microsoft.com/office/2006/metadata/properties/metaAttributes" ct:_="" ma:_="" ma:contentTypeName="TemplateFile" ma:contentTypeID="0x0101006EDDDB5EE6D98C44930B742096920B300400F5B6D36B3EF94B4E9A635CDF2A18F5B8" ma:contentTypeVersion="72" ma:contentTypeDescription="Create a new document." ma:contentTypeScope="" ma:versionID="a23e56308344d904b51738559c3d67c9">
   <xsd:schema xmlns:xsd="http://www.w3.org/2001/XMLSchema" xmlns:xs="http://www.w3.org/2001/XMLSchema" xmlns:p="http://schemas.microsoft.com/office/2006/metadata/properties" xmlns:ns2="4873beb7-5857-4685-be1f-d57550cc96cc" targetNamespace="http://schemas.microsoft.com/office/2006/metadata/properties" ma:root="true" ma:fieldsID="cd0908cc4600e77bf5da051303e00c8d" ns2:_="">
     <xsd:import namespace="4873beb7-5857-4685-be1f-d57550cc96cc"/>
@@ -6987,25 +7454,143 @@
 </ct:contentTypeSchema>
 </file>
 
-<file path=customXml/itemProps1.xml><?xml version="1.0" encoding="utf-8"?>
-<ds:datastoreItem xmlns:ds="http://schemas.openxmlformats.org/officeDocument/2006/customXml" ds:itemID="{A9F945EE-6400-432A-A9B1-179A0A2A37CE}">
-  <ds:schemaRefs>
-    <ds:schemaRef ds:uri="http://schemas.microsoft.com/office/2006/metadata/properties"/>
-    <ds:schemaRef ds:uri="http://schemas.microsoft.com/office/infopath/2007/PartnerControls"/>
-    <ds:schemaRef ds:uri="4873beb7-5857-4685-be1f-d57550cc96cc"/>
-  </ds:schemaRefs>
-</ds:datastoreItem>
+<file path=customXml/item2.xml><?xml version="1.0" encoding="utf-8"?>
+<?mso-contentType ?>
+<FormTemplates xmlns="http://schemas.microsoft.com/sharepoint/v3/contenttype/forms">
+  <Display>DocumentLibraryForm</Display>
+  <Edit>AssetEditForm</Edit>
+  <New>DocumentLibraryForm</New>
+</FormTemplates>
 </file>
 
-<file path=customXml/itemProps2.xml><?xml version="1.0" encoding="utf-8"?>
-<ds:datastoreItem xmlns:ds="http://schemas.openxmlformats.org/officeDocument/2006/customXml" ds:itemID="{A1110015-E380-4C53-980C-698226C61CAC}">
-  <ds:schemaRefs>
-    <ds:schemaRef ds:uri="http://schemas.microsoft.com/sharepoint/v3/contenttype/forms"/>
-  </ds:schemaRefs>
-</ds:datastoreItem>
+<file path=customXml/item3.xml><?xml version="1.0" encoding="utf-8"?>
+<p:properties xmlns:p="http://schemas.microsoft.com/office/2006/metadata/properties" xmlns:xsi="http://www.w3.org/2001/XMLSchema-instance" xmlns:pc="http://schemas.microsoft.com/office/infopath/2007/PartnerControls">
+  <documentManagement>
+    <DirectSourceMarket xmlns="4873beb7-5857-4685-be1f-d57550cc96cc" xsi:nil="true"/>
+    <ApprovalStatus xmlns="4873beb7-5857-4685-be1f-d57550cc96cc">InProgress</ApprovalStatus>
+    <MarketSpecific xmlns="4873beb7-5857-4685-be1f-d57550cc96cc">false</MarketSpecific>
+    <LocComments xmlns="4873beb7-5857-4685-be1f-d57550cc96cc" xsi:nil="true"/>
+    <ThumbnailAssetId xmlns="4873beb7-5857-4685-be1f-d57550cc96cc" xsi:nil="true"/>
+    <PrimaryImageGen xmlns="4873beb7-5857-4685-be1f-d57550cc96cc">true</PrimaryImageGen>
+    <LegacyData xmlns="4873beb7-5857-4685-be1f-d57550cc96cc" xsi:nil="true"/>
+    <LocRecommendedHandoff xmlns="4873beb7-5857-4685-be1f-d57550cc96cc" xsi:nil="true"/>
+    <BusinessGroup xmlns="4873beb7-5857-4685-be1f-d57550cc96cc" xsi:nil="true"/>
+    <BlockPublish xmlns="4873beb7-5857-4685-be1f-d57550cc96cc">false</BlockPublish>
+    <TPFriendlyName xmlns="4873beb7-5857-4685-be1f-d57550cc96cc" xsi:nil="true"/>
+    <NumericId xmlns="4873beb7-5857-4685-be1f-d57550cc96cc" xsi:nil="true"/>
+    <APEditor xmlns="4873beb7-5857-4685-be1f-d57550cc96cc">
+      <UserInfo>
+        <DisplayName/>
+        <AccountId xsi:nil="true"/>
+        <AccountType/>
+      </UserInfo>
+    </APEditor>
+    <SourceTitle xmlns="4873beb7-5857-4685-be1f-d57550cc96cc" xsi:nil="true"/>
+    <OpenTemplate xmlns="4873beb7-5857-4685-be1f-d57550cc96cc">true</OpenTemplate>
+    <UALocComments xmlns="4873beb7-5857-4685-be1f-d57550cc96cc" xsi:nil="true"/>
+    <ParentAssetId xmlns="4873beb7-5857-4685-be1f-d57550cc96cc" xsi:nil="true"/>
+    <IntlLangReviewDate xmlns="4873beb7-5857-4685-be1f-d57550cc96cc" xsi:nil="true"/>
+    <FeatureTagsTaxHTField0 xmlns="4873beb7-5857-4685-be1f-d57550cc96cc">
+      <Terms xmlns="http://schemas.microsoft.com/office/infopath/2007/PartnerControls"/>
+    </FeatureTagsTaxHTField0>
+    <PublishStatusLookup xmlns="4873beb7-5857-4685-be1f-d57550cc96cc">
+      <Value>1669414</Value>
+      <Value>1669470</Value>
+    </PublishStatusLookup>
+    <Providers xmlns="4873beb7-5857-4685-be1f-d57550cc96cc" xsi:nil="true"/>
+    <MachineTranslated xmlns="4873beb7-5857-4685-be1f-d57550cc96cc">false</MachineTranslated>
+    <OriginalSourceMarket xmlns="4873beb7-5857-4685-be1f-d57550cc96cc" xsi:nil="true"/>
+    <APDescription xmlns="4873beb7-5857-4685-be1f-d57550cc96cc" xsi:nil="true"/>
+    <ClipArtFilename xmlns="4873beb7-5857-4685-be1f-d57550cc96cc" xsi:nil="true"/>
+    <ContentItem xmlns="4873beb7-5857-4685-be1f-d57550cc96cc" xsi:nil="true"/>
+    <TPInstallLocation xmlns="4873beb7-5857-4685-be1f-d57550cc96cc" xsi:nil="true"/>
+    <PublishTargets xmlns="4873beb7-5857-4685-be1f-d57550cc96cc">OfficeOnlineVNext</PublishTargets>
+    <TimesCloned xmlns="4873beb7-5857-4685-be1f-d57550cc96cc" xsi:nil="true"/>
+    <AssetStart xmlns="4873beb7-5857-4685-be1f-d57550cc96cc">2013-01-21T12:05:00+00:00</AssetStart>
+    <Provider xmlns="4873beb7-5857-4685-be1f-d57550cc96cc" xsi:nil="true"/>
+    <AcquiredFrom xmlns="4873beb7-5857-4685-be1f-d57550cc96cc">Internal MS</AcquiredFrom>
+    <FriendlyTitle xmlns="4873beb7-5857-4685-be1f-d57550cc96cc" xsi:nil="true"/>
+    <LastHandOff xmlns="4873beb7-5857-4685-be1f-d57550cc96cc" xsi:nil="true"/>
+    <TPClientViewer xmlns="4873beb7-5857-4685-be1f-d57550cc96cc" xsi:nil="true"/>
+    <UACurrentWords xmlns="4873beb7-5857-4685-be1f-d57550cc96cc" xsi:nil="true"/>
+    <ArtSampleDocs xmlns="4873beb7-5857-4685-be1f-d57550cc96cc" xsi:nil="true"/>
+    <UALocRecommendation xmlns="4873beb7-5857-4685-be1f-d57550cc96cc">Localize</UALocRecommendation>
+    <Manager xmlns="4873beb7-5857-4685-be1f-d57550cc96cc" xsi:nil="true"/>
+    <ShowIn xmlns="4873beb7-5857-4685-be1f-d57550cc96cc">Show everywhere</ShowIn>
+    <UANotes xmlns="4873beb7-5857-4685-be1f-d57550cc96cc" xsi:nil="true"/>
+    <TemplateStatus xmlns="4873beb7-5857-4685-be1f-d57550cc96cc">Complete</TemplateStatus>
+    <InternalTagsTaxHTField0 xmlns="4873beb7-5857-4685-be1f-d57550cc96cc">
+      <Terms xmlns="http://schemas.microsoft.com/office/infopath/2007/PartnerControls"/>
+    </InternalTagsTaxHTField0>
+    <CSXHash xmlns="4873beb7-5857-4685-be1f-d57550cc96cc" xsi:nil="true"/>
+    <Downloads xmlns="4873beb7-5857-4685-be1f-d57550cc96cc">0</Downloads>
+    <VoteCount xmlns="4873beb7-5857-4685-be1f-d57550cc96cc" xsi:nil="true"/>
+    <OOCacheId xmlns="4873beb7-5857-4685-be1f-d57550cc96cc" xsi:nil="true"/>
+    <IsDeleted xmlns="4873beb7-5857-4685-be1f-d57550cc96cc">false</IsDeleted>
+    <AssetExpire xmlns="4873beb7-5857-4685-be1f-d57550cc96cc">2029-01-01T08:00:00+00:00</AssetExpire>
+    <DSATActionTaken xmlns="4873beb7-5857-4685-be1f-d57550cc96cc" xsi:nil="true"/>
+    <CSXSubmissionMarket xmlns="4873beb7-5857-4685-be1f-d57550cc96cc" xsi:nil="true"/>
+    <TPExecutable xmlns="4873beb7-5857-4685-be1f-d57550cc96cc" xsi:nil="true"/>
+    <SubmitterId xmlns="4873beb7-5857-4685-be1f-d57550cc96cc" xsi:nil="true"/>
+    <EditorialTags xmlns="4873beb7-5857-4685-be1f-d57550cc96cc" xsi:nil="true"/>
+    <AssetType xmlns="4873beb7-5857-4685-be1f-d57550cc96cc">TP</AssetType>
+    <BugNumber xmlns="4873beb7-5857-4685-be1f-d57550cc96cc" xsi:nil="true"/>
+    <CSXSubmissionDate xmlns="4873beb7-5857-4685-be1f-d57550cc96cc" xsi:nil="true"/>
+    <CSXUpdate xmlns="4873beb7-5857-4685-be1f-d57550cc96cc">false</CSXUpdate>
+    <ApprovalLog xmlns="4873beb7-5857-4685-be1f-d57550cc96cc" xsi:nil="true"/>
+    <Milestone xmlns="4873beb7-5857-4685-be1f-d57550cc96cc" xsi:nil="true"/>
+    <RecommendationsModifier xmlns="4873beb7-5857-4685-be1f-d57550cc96cc" xsi:nil="true"/>
+    <OriginAsset xmlns="4873beb7-5857-4685-be1f-d57550cc96cc" xsi:nil="true"/>
+    <TPComponent xmlns="4873beb7-5857-4685-be1f-d57550cc96cc" xsi:nil="true"/>
+    <AssetId xmlns="4873beb7-5857-4685-be1f-d57550cc96cc">TP104001550</AssetId>
+    <IntlLocPriority xmlns="4873beb7-5857-4685-be1f-d57550cc96cc" xsi:nil="true"/>
+    <PolicheckWords xmlns="4873beb7-5857-4685-be1f-d57550cc96cc" xsi:nil="true"/>
+    <TPLaunchHelpLink xmlns="4873beb7-5857-4685-be1f-d57550cc96cc" xsi:nil="true"/>
+    <TPApplication xmlns="4873beb7-5857-4685-be1f-d57550cc96cc" xsi:nil="true"/>
+    <CrawlForDependencies xmlns="4873beb7-5857-4685-be1f-d57550cc96cc">false</CrawlForDependencies>
+    <HandoffToMSDN xmlns="4873beb7-5857-4685-be1f-d57550cc96cc" xsi:nil="true"/>
+    <PlannedPubDate xmlns="4873beb7-5857-4685-be1f-d57550cc96cc" xsi:nil="true"/>
+    <IntlLangReviewer xmlns="4873beb7-5857-4685-be1f-d57550cc96cc" xsi:nil="true"/>
+    <TrustLevel xmlns="4873beb7-5857-4685-be1f-d57550cc96cc">1 Microsoft Managed Content</TrustLevel>
+    <LocLastLocAttemptVersionLookup xmlns="4873beb7-5857-4685-be1f-d57550cc96cc">875987</LocLastLocAttemptVersionLookup>
+    <IsSearchable xmlns="4873beb7-5857-4685-be1f-d57550cc96cc">true</IsSearchable>
+    <TemplateTemplateType xmlns="4873beb7-5857-4685-be1f-d57550cc96cc">PowerPoint Presentation Template</TemplateTemplateType>
+    <CampaignTagsTaxHTField0 xmlns="4873beb7-5857-4685-be1f-d57550cc96cc">
+      <Terms xmlns="http://schemas.microsoft.com/office/infopath/2007/PartnerControls"/>
+    </CampaignTagsTaxHTField0>
+    <TPNamespace xmlns="4873beb7-5857-4685-be1f-d57550cc96cc" xsi:nil="true"/>
+    <TaxCatchAll xmlns="4873beb7-5857-4685-be1f-d57550cc96cc"/>
+    <Markets xmlns="4873beb7-5857-4685-be1f-d57550cc96cc"/>
+    <UAProjectedTotalWords xmlns="4873beb7-5857-4685-be1f-d57550cc96cc" xsi:nil="true"/>
+    <LocMarketGroupTiers2 xmlns="4873beb7-5857-4685-be1f-d57550cc96cc" xsi:nil="true"/>
+    <IntlLangReview xmlns="4873beb7-5857-4685-be1f-d57550cc96cc">false</IntlLangReview>
+    <OutputCachingOn xmlns="4873beb7-5857-4685-be1f-d57550cc96cc">false</OutputCachingOn>
+    <AverageRating xmlns="4873beb7-5857-4685-be1f-d57550cc96cc" xsi:nil="true"/>
+    <APAuthor xmlns="4873beb7-5857-4685-be1f-d57550cc96cc">
+      <UserInfo>
+        <DisplayName>REDMOND\kristaa</DisplayName>
+        <AccountId>136</AccountId>
+        <AccountType/>
+      </UserInfo>
+    </APAuthor>
+    <LocManualTestRequired xmlns="4873beb7-5857-4685-be1f-d57550cc96cc">false</LocManualTestRequired>
+    <TPCommandLine xmlns="4873beb7-5857-4685-be1f-d57550cc96cc" xsi:nil="true"/>
+    <TPAppVersion xmlns="4873beb7-5857-4685-be1f-d57550cc96cc" xsi:nil="true"/>
+    <EditorialStatus xmlns="4873beb7-5857-4685-be1f-d57550cc96cc">Complete</EditorialStatus>
+    <LastModifiedDateTime xmlns="4873beb7-5857-4685-be1f-d57550cc96cc" xsi:nil="true"/>
+    <ScenarioTagsTaxHTField0 xmlns="4873beb7-5857-4685-be1f-d57550cc96cc">
+      <Terms xmlns="http://schemas.microsoft.com/office/infopath/2007/PartnerControls"/>
+    </ScenarioTagsTaxHTField0>
+    <OriginalRelease xmlns="4873beb7-5857-4685-be1f-d57550cc96cc">15</OriginalRelease>
+    <TPLaunchHelpLinkType xmlns="4873beb7-5857-4685-be1f-d57550cc96cc">Template</TPLaunchHelpLinkType>
+    <LocalizationTagsTaxHTField0 xmlns="4873beb7-5857-4685-be1f-d57550cc96cc">
+      <Terms xmlns="http://schemas.microsoft.com/office/infopath/2007/PartnerControls"/>
+    </LocalizationTagsTaxHTField0>
+  </documentManagement>
+</p:properties>
 </file>
 
-<file path=customXml/itemProps3.xml><?xml version="1.0" encoding="utf-8"?>
+<file path=customXml/itemProps1.xml><?xml version="1.0" encoding="utf-8"?>
 <ds:datastoreItem xmlns:ds="http://schemas.openxmlformats.org/officeDocument/2006/customXml" ds:itemID="{AF7E4019-AE58-4CAA-B67D-559F9FEEB202}">
   <ds:schemaRefs>
     <ds:schemaRef ds:uri="http://schemas.microsoft.com/office/2006/metadata/contentType"/>
@@ -7021,4 +7606,22 @@
     <ds:schemaRef ds:uri="http://schemas.microsoft.com/internal/obd"/>
   </ds:schemaRefs>
 </ds:datastoreItem>
+</file>
+
+<file path=customXml/itemProps2.xml><?xml version="1.0" encoding="utf-8"?>
+<ds:datastoreItem xmlns:ds="http://schemas.openxmlformats.org/officeDocument/2006/customXml" ds:itemID="{A1110015-E380-4C53-980C-698226C61CAC}">
+  <ds:schemaRefs>
+    <ds:schemaRef ds:uri="http://schemas.microsoft.com/sharepoint/v3/contenttype/forms"/>
+  </ds:schemaRefs>
+</ds:datastoreItem>
+</file>
+
+<file path=customXml/itemProps3.xml><?xml version="1.0" encoding="utf-8"?>
+<ds:datastoreItem xmlns:ds="http://schemas.openxmlformats.org/officeDocument/2006/customXml" ds:itemID="{A9F945EE-6400-432A-A9B1-179A0A2A37CE}">
+  <ds:schemaRefs>
+    <ds:schemaRef ds:uri="http://schemas.microsoft.com/office/2006/metadata/properties"/>
+    <ds:schemaRef ds:uri="http://schemas.microsoft.com/office/infopath/2007/PartnerControls"/>
+    <ds:schemaRef ds:uri="4873beb7-5857-4685-be1f-d57550cc96cc"/>
+  </ds:schemaRefs>
+</ds:datastoreItem>
 </file>
</xml_diff>